<commit_message>
PPT folytatása, a részem hozzáadása
</commit_message>
<xml_diff>
--- a/VALORANT útmutató.pptx
+++ b/VALORANT útmutató.pptx
@@ -7,8 +7,10 @@
   <p:sldIdLst>
     <p:sldId id="256" r:id="rId2"/>
     <p:sldId id="257" r:id="rId3"/>
-    <p:sldId id="258" r:id="rId4"/>
-    <p:sldId id="259" r:id="rId5"/>
+    <p:sldId id="261" r:id="rId4"/>
+    <p:sldId id="260" r:id="rId5"/>
+    <p:sldId id="258" r:id="rId6"/>
+    <p:sldId id="259" r:id="rId7"/>
   </p:sldIdLst>
   <p:sldSz cx="12192000" cy="6858000"/>
   <p:notesSz cx="6858000" cy="9144000"/>
@@ -157,10 +159,9 @@
           </a:lstStyle>
           <a:p>
             <a:r>
-              <a:rPr lang="hu-HU" smtClean="0"/>
+              <a:rPr lang="hu-HU"/>
               <a:t>Mintacím szerkesztése</a:t>
             </a:r>
-            <a:endParaRPr lang="hu-HU"/>
           </a:p>
         </p:txBody>
       </p:sp>
@@ -222,10 +223,9 @@
           </a:lstStyle>
           <a:p>
             <a:r>
-              <a:rPr lang="hu-HU" smtClean="0"/>
+              <a:rPr lang="hu-HU"/>
               <a:t>Kattintson ide az alcím mintájának szerkesztéséhez</a:t>
             </a:r>
-            <a:endParaRPr lang="hu-HU"/>
           </a:p>
         </p:txBody>
       </p:sp>
@@ -246,7 +246,7 @@
           <a:p>
             <a:fld id="{8A03A660-8C9C-4A1F-A743-276051C51089}" type="datetimeFigureOut">
               <a:rPr lang="hu-HU" smtClean="0"/>
-              <a:t>2023.02.03.</a:t>
+              <a:t>2023. 02. 07.</a:t>
             </a:fld>
             <a:endParaRPr lang="hu-HU" dirty="0"/>
           </a:p>
@@ -340,10 +340,9 @@
           <a:lstStyle/>
           <a:p>
             <a:r>
-              <a:rPr lang="hu-HU" smtClean="0"/>
+              <a:rPr lang="hu-HU"/>
               <a:t>Mintacím szerkesztése</a:t>
             </a:r>
-            <a:endParaRPr lang="hu-HU"/>
           </a:p>
         </p:txBody>
       </p:sp>
@@ -364,38 +363,37 @@
           <a:p>
             <a:pPr lvl="0"/>
             <a:r>
-              <a:rPr lang="hu-HU" smtClean="0"/>
+              <a:rPr lang="hu-HU"/>
               <a:t>Mintaszöveg szerkesztése</a:t>
             </a:r>
           </a:p>
           <a:p>
             <a:pPr lvl="1"/>
             <a:r>
-              <a:rPr lang="hu-HU" smtClean="0"/>
+              <a:rPr lang="hu-HU"/>
               <a:t>Második szint</a:t>
             </a:r>
           </a:p>
           <a:p>
             <a:pPr lvl="2"/>
             <a:r>
-              <a:rPr lang="hu-HU" smtClean="0"/>
+              <a:rPr lang="hu-HU"/>
               <a:t>Harmadik szint</a:t>
             </a:r>
           </a:p>
           <a:p>
             <a:pPr lvl="3"/>
             <a:r>
-              <a:rPr lang="hu-HU" smtClean="0"/>
+              <a:rPr lang="hu-HU"/>
               <a:t>Negyedik szint</a:t>
             </a:r>
           </a:p>
           <a:p>
             <a:pPr lvl="4"/>
             <a:r>
-              <a:rPr lang="hu-HU" smtClean="0"/>
+              <a:rPr lang="hu-HU"/>
               <a:t>Ötödik szint</a:t>
             </a:r>
-            <a:endParaRPr lang="hu-HU"/>
           </a:p>
         </p:txBody>
       </p:sp>
@@ -416,7 +414,7 @@
           <a:p>
             <a:fld id="{8A03A660-8C9C-4A1F-A743-276051C51089}" type="datetimeFigureOut">
               <a:rPr lang="hu-HU" smtClean="0"/>
-              <a:t>2023.02.03.</a:t>
+              <a:t>2023. 02. 07.</a:t>
             </a:fld>
             <a:endParaRPr lang="hu-HU" dirty="0"/>
           </a:p>
@@ -515,10 +513,9 @@
           <a:lstStyle/>
           <a:p>
             <a:r>
-              <a:rPr lang="hu-HU" smtClean="0"/>
+              <a:rPr lang="hu-HU"/>
               <a:t>Mintacím szerkesztése</a:t>
             </a:r>
-            <a:endParaRPr lang="hu-HU"/>
           </a:p>
         </p:txBody>
       </p:sp>
@@ -544,38 +541,37 @@
           <a:p>
             <a:pPr lvl="0"/>
             <a:r>
-              <a:rPr lang="hu-HU" smtClean="0"/>
+              <a:rPr lang="hu-HU"/>
               <a:t>Mintaszöveg szerkesztése</a:t>
             </a:r>
           </a:p>
           <a:p>
             <a:pPr lvl="1"/>
             <a:r>
-              <a:rPr lang="hu-HU" smtClean="0"/>
+              <a:rPr lang="hu-HU"/>
               <a:t>Második szint</a:t>
             </a:r>
           </a:p>
           <a:p>
             <a:pPr lvl="2"/>
             <a:r>
-              <a:rPr lang="hu-HU" smtClean="0"/>
+              <a:rPr lang="hu-HU"/>
               <a:t>Harmadik szint</a:t>
             </a:r>
           </a:p>
           <a:p>
             <a:pPr lvl="3"/>
             <a:r>
-              <a:rPr lang="hu-HU" smtClean="0"/>
+              <a:rPr lang="hu-HU"/>
               <a:t>Negyedik szint</a:t>
             </a:r>
           </a:p>
           <a:p>
             <a:pPr lvl="4"/>
             <a:r>
-              <a:rPr lang="hu-HU" smtClean="0"/>
+              <a:rPr lang="hu-HU"/>
               <a:t>Ötödik szint</a:t>
             </a:r>
-            <a:endParaRPr lang="hu-HU"/>
           </a:p>
         </p:txBody>
       </p:sp>
@@ -596,7 +592,7 @@
           <a:p>
             <a:fld id="{8A03A660-8C9C-4A1F-A743-276051C51089}" type="datetimeFigureOut">
               <a:rPr lang="hu-HU" smtClean="0"/>
-              <a:t>2023.02.03.</a:t>
+              <a:t>2023. 02. 07.</a:t>
             </a:fld>
             <a:endParaRPr lang="hu-HU" dirty="0"/>
           </a:p>
@@ -690,10 +686,9 @@
           <a:lstStyle/>
           <a:p>
             <a:r>
-              <a:rPr lang="hu-HU" smtClean="0"/>
+              <a:rPr lang="hu-HU"/>
               <a:t>Mintacím szerkesztése</a:t>
             </a:r>
-            <a:endParaRPr lang="hu-HU"/>
           </a:p>
         </p:txBody>
       </p:sp>
@@ -714,38 +709,37 @@
           <a:p>
             <a:pPr lvl="0"/>
             <a:r>
-              <a:rPr lang="hu-HU" smtClean="0"/>
+              <a:rPr lang="hu-HU"/>
               <a:t>Mintaszöveg szerkesztése</a:t>
             </a:r>
           </a:p>
           <a:p>
             <a:pPr lvl="1"/>
             <a:r>
-              <a:rPr lang="hu-HU" smtClean="0"/>
+              <a:rPr lang="hu-HU"/>
               <a:t>Második szint</a:t>
             </a:r>
           </a:p>
           <a:p>
             <a:pPr lvl="2"/>
             <a:r>
-              <a:rPr lang="hu-HU" smtClean="0"/>
+              <a:rPr lang="hu-HU"/>
               <a:t>Harmadik szint</a:t>
             </a:r>
           </a:p>
           <a:p>
             <a:pPr lvl="3"/>
             <a:r>
-              <a:rPr lang="hu-HU" smtClean="0"/>
+              <a:rPr lang="hu-HU"/>
               <a:t>Negyedik szint</a:t>
             </a:r>
           </a:p>
           <a:p>
             <a:pPr lvl="4"/>
             <a:r>
-              <a:rPr lang="hu-HU" smtClean="0"/>
+              <a:rPr lang="hu-HU"/>
               <a:t>Ötödik szint</a:t>
             </a:r>
-            <a:endParaRPr lang="hu-HU"/>
           </a:p>
         </p:txBody>
       </p:sp>
@@ -766,7 +760,7 @@
           <a:p>
             <a:fld id="{8A03A660-8C9C-4A1F-A743-276051C51089}" type="datetimeFigureOut">
               <a:rPr lang="hu-HU" smtClean="0"/>
-              <a:t>2023.02.03.</a:t>
+              <a:t>2023. 02. 07.</a:t>
             </a:fld>
             <a:endParaRPr lang="hu-HU" dirty="0"/>
           </a:p>
@@ -869,10 +863,9 @@
           </a:lstStyle>
           <a:p>
             <a:r>
-              <a:rPr lang="hu-HU" smtClean="0"/>
+              <a:rPr lang="hu-HU"/>
               <a:t>Mintacím szerkesztése</a:t>
             </a:r>
-            <a:endParaRPr lang="hu-HU"/>
           </a:p>
         </p:txBody>
       </p:sp>
@@ -989,7 +982,7 @@
           <a:p>
             <a:pPr lvl="0"/>
             <a:r>
-              <a:rPr lang="hu-HU" smtClean="0"/>
+              <a:rPr lang="hu-HU"/>
               <a:t>Mintaszöveg szerkesztése</a:t>
             </a:r>
           </a:p>
@@ -1012,7 +1005,7 @@
           <a:p>
             <a:fld id="{8A03A660-8C9C-4A1F-A743-276051C51089}" type="datetimeFigureOut">
               <a:rPr lang="hu-HU" smtClean="0"/>
-              <a:t>2023.02.03.</a:t>
+              <a:t>2023. 02. 07.</a:t>
             </a:fld>
             <a:endParaRPr lang="hu-HU" dirty="0"/>
           </a:p>
@@ -1106,10 +1099,9 @@
           <a:lstStyle/>
           <a:p>
             <a:r>
-              <a:rPr lang="hu-HU" smtClean="0"/>
+              <a:rPr lang="hu-HU"/>
               <a:t>Mintacím szerkesztése</a:t>
             </a:r>
-            <a:endParaRPr lang="hu-HU"/>
           </a:p>
         </p:txBody>
       </p:sp>
@@ -1135,38 +1127,37 @@
           <a:p>
             <a:pPr lvl="0"/>
             <a:r>
-              <a:rPr lang="hu-HU" smtClean="0"/>
+              <a:rPr lang="hu-HU"/>
               <a:t>Mintaszöveg szerkesztése</a:t>
             </a:r>
           </a:p>
           <a:p>
             <a:pPr lvl="1"/>
             <a:r>
-              <a:rPr lang="hu-HU" smtClean="0"/>
+              <a:rPr lang="hu-HU"/>
               <a:t>Második szint</a:t>
             </a:r>
           </a:p>
           <a:p>
             <a:pPr lvl="2"/>
             <a:r>
-              <a:rPr lang="hu-HU" smtClean="0"/>
+              <a:rPr lang="hu-HU"/>
               <a:t>Harmadik szint</a:t>
             </a:r>
           </a:p>
           <a:p>
             <a:pPr lvl="3"/>
             <a:r>
-              <a:rPr lang="hu-HU" smtClean="0"/>
+              <a:rPr lang="hu-HU"/>
               <a:t>Negyedik szint</a:t>
             </a:r>
           </a:p>
           <a:p>
             <a:pPr lvl="4"/>
             <a:r>
-              <a:rPr lang="hu-HU" smtClean="0"/>
+              <a:rPr lang="hu-HU"/>
               <a:t>Ötödik szint</a:t>
             </a:r>
-            <a:endParaRPr lang="hu-HU"/>
           </a:p>
         </p:txBody>
       </p:sp>
@@ -1192,38 +1183,37 @@
           <a:p>
             <a:pPr lvl="0"/>
             <a:r>
-              <a:rPr lang="hu-HU" smtClean="0"/>
+              <a:rPr lang="hu-HU"/>
               <a:t>Mintaszöveg szerkesztése</a:t>
             </a:r>
           </a:p>
           <a:p>
             <a:pPr lvl="1"/>
             <a:r>
-              <a:rPr lang="hu-HU" smtClean="0"/>
+              <a:rPr lang="hu-HU"/>
               <a:t>Második szint</a:t>
             </a:r>
           </a:p>
           <a:p>
             <a:pPr lvl="2"/>
             <a:r>
-              <a:rPr lang="hu-HU" smtClean="0"/>
+              <a:rPr lang="hu-HU"/>
               <a:t>Harmadik szint</a:t>
             </a:r>
           </a:p>
           <a:p>
             <a:pPr lvl="3"/>
             <a:r>
-              <a:rPr lang="hu-HU" smtClean="0"/>
+              <a:rPr lang="hu-HU"/>
               <a:t>Negyedik szint</a:t>
             </a:r>
           </a:p>
           <a:p>
             <a:pPr lvl="4"/>
             <a:r>
-              <a:rPr lang="hu-HU" smtClean="0"/>
+              <a:rPr lang="hu-HU"/>
               <a:t>Ötödik szint</a:t>
             </a:r>
-            <a:endParaRPr lang="hu-HU"/>
           </a:p>
         </p:txBody>
       </p:sp>
@@ -1244,7 +1234,7 @@
           <a:p>
             <a:fld id="{8A03A660-8C9C-4A1F-A743-276051C51089}" type="datetimeFigureOut">
               <a:rPr lang="hu-HU" smtClean="0"/>
-              <a:t>2023.02.03.</a:t>
+              <a:t>2023. 02. 07.</a:t>
             </a:fld>
             <a:endParaRPr lang="hu-HU" dirty="0"/>
           </a:p>
@@ -1343,10 +1333,9 @@
           <a:lstStyle/>
           <a:p>
             <a:r>
-              <a:rPr lang="hu-HU" smtClean="0"/>
+              <a:rPr lang="hu-HU"/>
               <a:t>Mintacím szerkesztése</a:t>
             </a:r>
-            <a:endParaRPr lang="hu-HU"/>
           </a:p>
         </p:txBody>
       </p:sp>
@@ -1409,7 +1398,7 @@
           <a:p>
             <a:pPr lvl="0"/>
             <a:r>
-              <a:rPr lang="hu-HU" smtClean="0"/>
+              <a:rPr lang="hu-HU"/>
               <a:t>Mintaszöveg szerkesztése</a:t>
             </a:r>
           </a:p>
@@ -1437,38 +1426,37 @@
           <a:p>
             <a:pPr lvl="0"/>
             <a:r>
-              <a:rPr lang="hu-HU" smtClean="0"/>
+              <a:rPr lang="hu-HU"/>
               <a:t>Mintaszöveg szerkesztése</a:t>
             </a:r>
           </a:p>
           <a:p>
             <a:pPr lvl="1"/>
             <a:r>
-              <a:rPr lang="hu-HU" smtClean="0"/>
+              <a:rPr lang="hu-HU"/>
               <a:t>Második szint</a:t>
             </a:r>
           </a:p>
           <a:p>
             <a:pPr lvl="2"/>
             <a:r>
-              <a:rPr lang="hu-HU" smtClean="0"/>
+              <a:rPr lang="hu-HU"/>
               <a:t>Harmadik szint</a:t>
             </a:r>
           </a:p>
           <a:p>
             <a:pPr lvl="3"/>
             <a:r>
-              <a:rPr lang="hu-HU" smtClean="0"/>
+              <a:rPr lang="hu-HU"/>
               <a:t>Negyedik szint</a:t>
             </a:r>
           </a:p>
           <a:p>
             <a:pPr lvl="4"/>
             <a:r>
-              <a:rPr lang="hu-HU" smtClean="0"/>
+              <a:rPr lang="hu-HU"/>
               <a:t>Ötödik szint</a:t>
             </a:r>
-            <a:endParaRPr lang="hu-HU"/>
           </a:p>
         </p:txBody>
       </p:sp>
@@ -1531,7 +1519,7 @@
           <a:p>
             <a:pPr lvl="0"/>
             <a:r>
-              <a:rPr lang="hu-HU" smtClean="0"/>
+              <a:rPr lang="hu-HU"/>
               <a:t>Mintaszöveg szerkesztése</a:t>
             </a:r>
           </a:p>
@@ -1559,38 +1547,37 @@
           <a:p>
             <a:pPr lvl="0"/>
             <a:r>
-              <a:rPr lang="hu-HU" smtClean="0"/>
+              <a:rPr lang="hu-HU"/>
               <a:t>Mintaszöveg szerkesztése</a:t>
             </a:r>
           </a:p>
           <a:p>
             <a:pPr lvl="1"/>
             <a:r>
-              <a:rPr lang="hu-HU" smtClean="0"/>
+              <a:rPr lang="hu-HU"/>
               <a:t>Második szint</a:t>
             </a:r>
           </a:p>
           <a:p>
             <a:pPr lvl="2"/>
             <a:r>
-              <a:rPr lang="hu-HU" smtClean="0"/>
+              <a:rPr lang="hu-HU"/>
               <a:t>Harmadik szint</a:t>
             </a:r>
           </a:p>
           <a:p>
             <a:pPr lvl="3"/>
             <a:r>
-              <a:rPr lang="hu-HU" smtClean="0"/>
+              <a:rPr lang="hu-HU"/>
               <a:t>Negyedik szint</a:t>
             </a:r>
           </a:p>
           <a:p>
             <a:pPr lvl="4"/>
             <a:r>
-              <a:rPr lang="hu-HU" smtClean="0"/>
+              <a:rPr lang="hu-HU"/>
               <a:t>Ötödik szint</a:t>
             </a:r>
-            <a:endParaRPr lang="hu-HU"/>
           </a:p>
         </p:txBody>
       </p:sp>
@@ -1611,7 +1598,7 @@
           <a:p>
             <a:fld id="{8A03A660-8C9C-4A1F-A743-276051C51089}" type="datetimeFigureOut">
               <a:rPr lang="hu-HU" smtClean="0"/>
-              <a:t>2023.02.03.</a:t>
+              <a:t>2023. 02. 07.</a:t>
             </a:fld>
             <a:endParaRPr lang="hu-HU" dirty="0"/>
           </a:p>
@@ -1705,10 +1692,9 @@
           <a:lstStyle/>
           <a:p>
             <a:r>
-              <a:rPr lang="hu-HU" smtClean="0"/>
+              <a:rPr lang="hu-HU"/>
               <a:t>Mintacím szerkesztése</a:t>
             </a:r>
-            <a:endParaRPr lang="hu-HU"/>
           </a:p>
         </p:txBody>
       </p:sp>
@@ -1729,7 +1715,7 @@
           <a:p>
             <a:fld id="{8A03A660-8C9C-4A1F-A743-276051C51089}" type="datetimeFigureOut">
               <a:rPr lang="hu-HU" smtClean="0"/>
-              <a:t>2023.02.03.</a:t>
+              <a:t>2023. 02. 07.</a:t>
             </a:fld>
             <a:endParaRPr lang="hu-HU" dirty="0"/>
           </a:p>
@@ -1824,7 +1810,7 @@
           <a:p>
             <a:fld id="{8A03A660-8C9C-4A1F-A743-276051C51089}" type="datetimeFigureOut">
               <a:rPr lang="hu-HU" smtClean="0"/>
-              <a:t>2023.02.03.</a:t>
+              <a:t>2023. 02. 07.</a:t>
             </a:fld>
             <a:endParaRPr lang="hu-HU" dirty="0"/>
           </a:p>
@@ -1927,10 +1913,9 @@
           </a:lstStyle>
           <a:p>
             <a:r>
-              <a:rPr lang="hu-HU" smtClean="0"/>
+              <a:rPr lang="hu-HU"/>
               <a:t>Mintacím szerkesztése</a:t>
             </a:r>
-            <a:endParaRPr lang="hu-HU"/>
           </a:p>
         </p:txBody>
       </p:sp>
@@ -1984,38 +1969,37 @@
           <a:p>
             <a:pPr lvl="0"/>
             <a:r>
-              <a:rPr lang="hu-HU" smtClean="0"/>
+              <a:rPr lang="hu-HU"/>
               <a:t>Mintaszöveg szerkesztése</a:t>
             </a:r>
           </a:p>
           <a:p>
             <a:pPr lvl="1"/>
             <a:r>
-              <a:rPr lang="hu-HU" smtClean="0"/>
+              <a:rPr lang="hu-HU"/>
               <a:t>Második szint</a:t>
             </a:r>
           </a:p>
           <a:p>
             <a:pPr lvl="2"/>
             <a:r>
-              <a:rPr lang="hu-HU" smtClean="0"/>
+              <a:rPr lang="hu-HU"/>
               <a:t>Harmadik szint</a:t>
             </a:r>
           </a:p>
           <a:p>
             <a:pPr lvl="3"/>
             <a:r>
-              <a:rPr lang="hu-HU" smtClean="0"/>
+              <a:rPr lang="hu-HU"/>
               <a:t>Negyedik szint</a:t>
             </a:r>
           </a:p>
           <a:p>
             <a:pPr lvl="4"/>
             <a:r>
-              <a:rPr lang="hu-HU" smtClean="0"/>
+              <a:rPr lang="hu-HU"/>
               <a:t>Ötödik szint</a:t>
             </a:r>
-            <a:endParaRPr lang="hu-HU"/>
           </a:p>
         </p:txBody>
       </p:sp>
@@ -2078,7 +2062,7 @@
           <a:p>
             <a:pPr lvl="0"/>
             <a:r>
-              <a:rPr lang="hu-HU" smtClean="0"/>
+              <a:rPr lang="hu-HU"/>
               <a:t>Mintaszöveg szerkesztése</a:t>
             </a:r>
           </a:p>
@@ -2101,7 +2085,7 @@
           <a:p>
             <a:fld id="{8A03A660-8C9C-4A1F-A743-276051C51089}" type="datetimeFigureOut">
               <a:rPr lang="hu-HU" smtClean="0"/>
-              <a:t>2023.02.03.</a:t>
+              <a:t>2023. 02. 07.</a:t>
             </a:fld>
             <a:endParaRPr lang="hu-HU" dirty="0"/>
           </a:p>
@@ -2204,10 +2188,9 @@
           </a:lstStyle>
           <a:p>
             <a:r>
-              <a:rPr lang="hu-HU" smtClean="0"/>
+              <a:rPr lang="hu-HU"/>
               <a:t>Mintacím szerkesztése</a:t>
             </a:r>
-            <a:endParaRPr lang="hu-HU"/>
           </a:p>
         </p:txBody>
       </p:sp>
@@ -2331,7 +2314,7 @@
           <a:p>
             <a:pPr lvl="0"/>
             <a:r>
-              <a:rPr lang="hu-HU" smtClean="0"/>
+              <a:rPr lang="hu-HU"/>
               <a:t>Mintaszöveg szerkesztése</a:t>
             </a:r>
           </a:p>
@@ -2354,7 +2337,7 @@
           <a:p>
             <a:fld id="{8A03A660-8C9C-4A1F-A743-276051C51089}" type="datetimeFigureOut">
               <a:rPr lang="hu-HU" smtClean="0"/>
-              <a:t>2023.02.03.</a:t>
+              <a:t>2023. 02. 07.</a:t>
             </a:fld>
             <a:endParaRPr lang="hu-HU" dirty="0"/>
           </a:p>
@@ -2463,10 +2446,9 @@
           <a:lstStyle/>
           <a:p>
             <a:r>
-              <a:rPr lang="hu-HU" smtClean="0"/>
+              <a:rPr lang="hu-HU"/>
               <a:t>Mintacím szerkesztése</a:t>
             </a:r>
-            <a:endParaRPr lang="hu-HU"/>
           </a:p>
         </p:txBody>
       </p:sp>
@@ -2497,38 +2479,37 @@
           <a:p>
             <a:pPr lvl="0"/>
             <a:r>
-              <a:rPr lang="hu-HU" smtClean="0"/>
+              <a:rPr lang="hu-HU"/>
               <a:t>Mintaszöveg szerkesztése</a:t>
             </a:r>
           </a:p>
           <a:p>
             <a:pPr lvl="1"/>
             <a:r>
-              <a:rPr lang="hu-HU" smtClean="0"/>
+              <a:rPr lang="hu-HU"/>
               <a:t>Második szint</a:t>
             </a:r>
           </a:p>
           <a:p>
             <a:pPr lvl="2"/>
             <a:r>
-              <a:rPr lang="hu-HU" smtClean="0"/>
+              <a:rPr lang="hu-HU"/>
               <a:t>Harmadik szint</a:t>
             </a:r>
           </a:p>
           <a:p>
             <a:pPr lvl="3"/>
             <a:r>
-              <a:rPr lang="hu-HU" smtClean="0"/>
+              <a:rPr lang="hu-HU"/>
               <a:t>Negyedik szint</a:t>
             </a:r>
           </a:p>
           <a:p>
             <a:pPr lvl="4"/>
             <a:r>
-              <a:rPr lang="hu-HU" smtClean="0"/>
+              <a:rPr lang="hu-HU"/>
               <a:t>Ötödik szint</a:t>
             </a:r>
-            <a:endParaRPr lang="hu-HU"/>
           </a:p>
         </p:txBody>
       </p:sp>
@@ -2567,7 +2548,7 @@
           <a:p>
             <a:fld id="{8A03A660-8C9C-4A1F-A743-276051C51089}" type="datetimeFigureOut">
               <a:rPr lang="hu-HU" smtClean="0"/>
-              <a:t>2023.02.03.</a:t>
+              <a:t>2023. 02. 07.</a:t>
             </a:fld>
             <a:endParaRPr lang="hu-HU" dirty="0"/>
           </a:p>
@@ -2992,8 +2973,8 @@
         </p:nvSpPr>
         <p:spPr>
           <a:xfrm>
-            <a:off x="0" y="4402666"/>
-            <a:ext cx="8077200" cy="982133"/>
+            <a:off x="-1" y="4402666"/>
+            <a:ext cx="9019309" cy="982133"/>
           </a:xfrm>
         </p:spPr>
         <p:txBody>
@@ -3003,18 +2984,31 @@
           <a:lstStyle/>
           <a:p>
             <a:r>
-              <a:rPr lang="hu-HU" sz="7000" dirty="0" smtClean="0">
+              <a:rPr lang="hu-HU" sz="7000" dirty="0">
                 <a:solidFill>
                   <a:srgbClr val="FE4755"/>
                 </a:solidFill>
+                <a:latin typeface="VALORANT" pitchFamily="2" charset="0"/>
               </a:rPr>
-              <a:t>VALORANT útmutató</a:t>
-            </a:r>
-            <a:endParaRPr lang="hu-HU" sz="7000" dirty="0">
-              <a:solidFill>
-                <a:srgbClr val="FE4755"/>
-              </a:solidFill>
-            </a:endParaRPr>
+              <a:t>VALORANT</a:t>
+            </a:r>
+            <a:r>
+              <a:rPr lang="hu-HU" sz="7000" dirty="0">
+                <a:solidFill>
+                  <a:srgbClr val="FE4755"/>
+                </a:solidFill>
+              </a:rPr>
+              <a:t> </a:t>
+            </a:r>
+            <a:r>
+              <a:rPr lang="hu-HU" sz="7000" dirty="0">
+                <a:solidFill>
+                  <a:srgbClr val="FE4755"/>
+                </a:solidFill>
+                <a:latin typeface="Arial Nova" panose="020B0604020202020204" pitchFamily="34" charset="0"/>
+              </a:rPr>
+              <a:t>útmutató</a:t>
+            </a:r>
           </a:p>
         </p:txBody>
       </p:sp>
@@ -3041,18 +3035,13 @@
           <a:lstStyle/>
           <a:p>
             <a:r>
-              <a:rPr lang="hu-HU" sz="2500" dirty="0" smtClean="0">
+              <a:rPr lang="hu-HU" sz="2500" dirty="0">
                 <a:solidFill>
                   <a:srgbClr val="FE4755"/>
                 </a:solidFill>
               </a:rPr>
               <a:t>Készítette: Csanádi Kevin, Tarr Gábor, Dudás Levente</a:t>
             </a:r>
-            <a:endParaRPr lang="hu-HU" sz="2500" dirty="0">
-              <a:solidFill>
-                <a:srgbClr val="FE4755"/>
-              </a:solidFill>
-            </a:endParaRPr>
           </a:p>
         </p:txBody>
       </p:sp>
@@ -3066,13 +3055,6 @@
   <p:clrMapOvr>
     <a:masterClrMapping/>
   </p:clrMapOvr>
-  <p:timing>
-    <p:tnLst>
-      <p:par>
-        <p:cTn id="1" dur="indefinite" restart="never" nodeType="tmRoot"/>
-      </p:par>
-    </p:tnLst>
-  </p:timing>
 </p:sld>
 </file>
 
@@ -3111,8 +3093,8 @@
         </p:nvSpPr>
         <p:spPr>
           <a:xfrm>
-            <a:off x="344904" y="16042"/>
-            <a:ext cx="7716253" cy="1876926"/>
+            <a:off x="344904" y="224443"/>
+            <a:ext cx="3583629" cy="1020715"/>
           </a:xfrm>
           <a:prstGeom prst="rect">
             <a:avLst/>
@@ -3144,99 +3126,44 @@
           <a:p>
             <a:pPr algn="l"/>
             <a:r>
-              <a:rPr lang="hu-HU" sz="4500" dirty="0" smtClean="0">
+              <a:rPr lang="hu-HU" sz="4500" dirty="0">
                 <a:solidFill>
                   <a:srgbClr val="FE4755"/>
                 </a:solidFill>
+                <a:latin typeface="Arial Nova" panose="020B0504020202020204" pitchFamily="34" charset="0"/>
               </a:rPr>
-              <a:t>Csanádi Kevin része a munkából</a:t>
-            </a:r>
-            <a:br>
-              <a:rPr lang="hu-HU" sz="4500" dirty="0" smtClean="0">
+              <a:t>Az </a:t>
+            </a:r>
+            <a:r>
+              <a:rPr lang="en-US" sz="4500" dirty="0">
                 <a:solidFill>
                   <a:srgbClr val="FE4755"/>
                 </a:solidFill>
+                <a:latin typeface="Arial Nova" panose="020B0504020202020204" pitchFamily="34" charset="0"/>
               </a:rPr>
-            </a:br>
-            <a:endParaRPr lang="hu-HU" sz="4500" dirty="0">
-              <a:solidFill>
-                <a:srgbClr val="FE4755"/>
-              </a:solidFill>
-            </a:endParaRPr>
-          </a:p>
-        </p:txBody>
-      </p:sp>
-      <p:sp>
-        <p:nvSpPr>
-          <p:cNvPr id="9" name="Szövegdoboz 8"/>
-          <p:cNvSpPr txBox="1"/>
-          <p:nvPr/>
-        </p:nvSpPr>
-        <p:spPr>
-          <a:xfrm>
-            <a:off x="344904" y="2277979"/>
-            <a:ext cx="5871411" cy="1892826"/>
-          </a:xfrm>
-          <a:prstGeom prst="rect">
-            <a:avLst/>
-          </a:prstGeom>
-          <a:noFill/>
-        </p:spPr>
-        <p:txBody>
-          <a:bodyPr wrap="square" rtlCol="0">
-            <a:spAutoFit/>
-          </a:bodyPr>
-          <a:lstStyle/>
-          <a:p>
-            <a:pPr>
-              <a:lnSpc>
-                <a:spcPct val="150000"/>
-              </a:lnSpc>
-            </a:pPr>
-            <a:r>
-              <a:rPr lang="hu-HU" sz="2600" dirty="0" smtClean="0">
+              <a:t>f</a:t>
+            </a:r>
+            <a:r>
+              <a:rPr lang="hu-HU" sz="4500" dirty="0">
                 <a:solidFill>
                   <a:srgbClr val="FE4755"/>
                 </a:solidFill>
+                <a:latin typeface="Arial Nova" panose="020B0504020202020204" pitchFamily="34" charset="0"/>
               </a:rPr>
-              <a:t>Főoldal megtervezése</a:t>
-            </a:r>
-          </a:p>
-          <a:p>
-            <a:pPr>
-              <a:lnSpc>
-                <a:spcPct val="150000"/>
-              </a:lnSpc>
-            </a:pPr>
-            <a:r>
-              <a:rPr lang="hu-HU" sz="2600" dirty="0" smtClean="0">
-                <a:solidFill>
-                  <a:srgbClr val="FE4755"/>
-                </a:solidFill>
-              </a:rPr>
-              <a:t>Főoldal design ötlet megvalósítása</a:t>
-            </a:r>
-          </a:p>
-          <a:p>
-            <a:pPr>
-              <a:lnSpc>
-                <a:spcPct val="150000"/>
-              </a:lnSpc>
-            </a:pPr>
-            <a:r>
-              <a:rPr lang="hu-HU" sz="2600" dirty="0" smtClean="0">
-                <a:solidFill>
-                  <a:srgbClr val="FE4755"/>
-                </a:solidFill>
-              </a:rPr>
-              <a:t>Ascent, Bind, Breeze aloldalak elkészítése</a:t>
+              <a:t>őoldalról</a:t>
             </a:r>
           </a:p>
         </p:txBody>
       </p:sp>
       <p:pic>
         <p:nvPicPr>
-          <p:cNvPr id="11" name="Kép 10"/>
+          <p:cNvPr id="3" name="Kép 2">
+            <a:extLst>
+              <a:ext uri="{FF2B5EF4-FFF2-40B4-BE49-F238E27FC236}">
+                <a16:creationId xmlns:a16="http://schemas.microsoft.com/office/drawing/2014/main" id="{66A8F39C-C7E6-B32F-11C3-EF0B84BE03B2}"/>
+              </a:ext>
+            </a:extLst>
+          </p:cNvPr>
           <p:cNvPicPr>
             <a:picLocks noChangeAspect="1"/>
           </p:cNvPicPr>
@@ -3250,8 +3177,8 @@
         </p:blipFill>
         <p:spPr>
           <a:xfrm>
-            <a:off x="7048428" y="2277979"/>
-            <a:ext cx="4951066" cy="3810000"/>
+            <a:off x="8702997" y="1245158"/>
+            <a:ext cx="2757188" cy="4989444"/>
           </a:xfrm>
           <a:prstGeom prst="rect">
             <a:avLst/>
@@ -3260,14 +3187,20 @@
       </p:pic>
       <p:sp>
         <p:nvSpPr>
-          <p:cNvPr id="12" name="Szövegdoboz 11"/>
+          <p:cNvPr id="13" name="Szövegdoboz 12">
+            <a:extLst>
+              <a:ext uri="{FF2B5EF4-FFF2-40B4-BE49-F238E27FC236}">
+                <a16:creationId xmlns:a16="http://schemas.microsoft.com/office/drawing/2014/main" id="{D7861877-B098-ED1E-1DEE-EF077BBA9F30}"/>
+              </a:ext>
+            </a:extLst>
+          </p:cNvPr>
           <p:cNvSpPr txBox="1"/>
           <p:nvPr/>
         </p:nvSpPr>
         <p:spPr>
           <a:xfrm>
-            <a:off x="8318279" y="6103658"/>
-            <a:ext cx="2411365" cy="369332"/>
+            <a:off x="8948530" y="6234602"/>
+            <a:ext cx="2266122" cy="369332"/>
           </a:xfrm>
           <a:prstGeom prst="rect">
             <a:avLst/>
@@ -3280,13 +3213,92 @@
           </a:bodyPr>
           <a:lstStyle/>
           <a:p>
-            <a:r>
-              <a:rPr lang="hu-HU" dirty="0" smtClean="0">
+            <a:pPr algn="ctr"/>
+            <a:r>
+              <a:rPr lang="hu-HU" dirty="0">
                 <a:solidFill>
                   <a:srgbClr val="FE4755"/>
                 </a:solidFill>
+                <a:latin typeface="Arial Nova" panose="020B0504020202020204" pitchFamily="34" charset="0"/>
               </a:rPr>
-              <a:t>Kódrészlet a fő oldalból</a:t>
+              <a:t>Részlet a főoldalból</a:t>
+            </a:r>
+          </a:p>
+        </p:txBody>
+      </p:sp>
+      <p:sp>
+        <p:nvSpPr>
+          <p:cNvPr id="15" name="Szövegdoboz 14">
+            <a:extLst>
+              <a:ext uri="{FF2B5EF4-FFF2-40B4-BE49-F238E27FC236}">
+                <a16:creationId xmlns:a16="http://schemas.microsoft.com/office/drawing/2014/main" id="{DC903C29-0836-ADC2-EDF9-D21C7664D7AC}"/>
+              </a:ext>
+            </a:extLst>
+          </p:cNvPr>
+          <p:cNvSpPr txBox="1"/>
+          <p:nvPr/>
+        </p:nvSpPr>
+        <p:spPr>
+          <a:xfrm>
+            <a:off x="344904" y="2282532"/>
+            <a:ext cx="3212943" cy="1830758"/>
+          </a:xfrm>
+          <a:prstGeom prst="rect">
+            <a:avLst/>
+          </a:prstGeom>
+          <a:noFill/>
+        </p:spPr>
+        <p:txBody>
+          <a:bodyPr wrap="square" rtlCol="0">
+            <a:spAutoFit/>
+          </a:bodyPr>
+          <a:lstStyle/>
+          <a:p>
+            <a:pPr>
+              <a:lnSpc>
+                <a:spcPct val="150000"/>
+              </a:lnSpc>
+            </a:pPr>
+            <a:r>
+              <a:rPr lang="hu-HU" sz="2600" dirty="0">
+                <a:solidFill>
+                  <a:srgbClr val="FE4755"/>
+                </a:solidFill>
+                <a:latin typeface="Arial Nova" panose="020B0504020202020204" pitchFamily="34" charset="0"/>
+              </a:rPr>
+              <a:t>Vizuális effektek</a:t>
+            </a:r>
+          </a:p>
+          <a:p>
+            <a:pPr>
+              <a:lnSpc>
+                <a:spcPct val="150000"/>
+              </a:lnSpc>
+            </a:pPr>
+            <a:r>
+              <a:rPr lang="hu-HU" sz="2600" dirty="0">
+                <a:solidFill>
+                  <a:srgbClr val="FE4755"/>
+                </a:solidFill>
+                <a:latin typeface="Arial Nova" panose="020B0504020202020204" pitchFamily="34" charset="0"/>
+              </a:rPr>
+              <a:t>Könnyű navigáció</a:t>
+            </a:r>
+          </a:p>
+          <a:p>
+            <a:pPr>
+              <a:lnSpc>
+                <a:spcPct val="150000"/>
+              </a:lnSpc>
+            </a:pPr>
+            <a:r>
+              <a:rPr lang="hu-HU" sz="2600" dirty="0">
+                <a:solidFill>
+                  <a:srgbClr val="FE4755"/>
+                </a:solidFill>
+                <a:latin typeface="Arial Nova" panose="020B0504020202020204" pitchFamily="34" charset="0"/>
+              </a:rPr>
+              <a:t>Jó olvashatóság</a:t>
             </a:r>
           </a:p>
         </p:txBody>
@@ -3301,13 +3313,6 @@
   <p:clrMapOvr>
     <a:masterClrMapping/>
   </p:clrMapOvr>
-  <p:timing>
-    <p:tnLst>
-      <p:par>
-        <p:cTn id="1" dur="indefinite" restart="never" nodeType="tmRoot"/>
-      </p:par>
-    </p:tnLst>
-  </p:timing>
 </p:sld>
 </file>
 
@@ -3346,8 +3351,8 @@
         </p:nvSpPr>
         <p:spPr>
           <a:xfrm>
-            <a:off x="344904" y="16042"/>
-            <a:ext cx="7716253" cy="1876926"/>
+            <a:off x="344904" y="224443"/>
+            <a:ext cx="4002652" cy="1020715"/>
           </a:xfrm>
           <a:prstGeom prst="rect">
             <a:avLst/>
@@ -3379,38 +3384,33 @@
           <a:p>
             <a:pPr algn="l"/>
             <a:r>
-              <a:rPr lang="hu-HU" sz="4500" dirty="0" smtClean="0">
+              <a:rPr lang="hu-HU" sz="4500" dirty="0">
                 <a:solidFill>
                   <a:srgbClr val="FE4755"/>
                 </a:solidFill>
+                <a:latin typeface="Arial Nova" panose="020B0504020202020204" pitchFamily="34" charset="0"/>
               </a:rPr>
-              <a:t>Csanádi Kevin része a munkából</a:t>
-            </a:r>
-            <a:br>
-              <a:rPr lang="hu-HU" sz="4500" dirty="0" smtClean="0">
-                <a:solidFill>
-                  <a:srgbClr val="FE4755"/>
-                </a:solidFill>
-              </a:rPr>
-            </a:br>
-            <a:endParaRPr lang="hu-HU" sz="4500" dirty="0">
-              <a:solidFill>
-                <a:srgbClr val="FE4755"/>
-              </a:solidFill>
-            </a:endParaRPr>
-          </a:p>
-        </p:txBody>
-      </p:sp>
-      <p:sp>
-        <p:nvSpPr>
-          <p:cNvPr id="9" name="Szövegdoboz 8"/>
+              <a:t>Az aloldalakról</a:t>
+            </a:r>
+          </a:p>
+        </p:txBody>
+      </p:sp>
+      <p:sp>
+        <p:nvSpPr>
+          <p:cNvPr id="13" name="Szövegdoboz 12">
+            <a:extLst>
+              <a:ext uri="{FF2B5EF4-FFF2-40B4-BE49-F238E27FC236}">
+                <a16:creationId xmlns:a16="http://schemas.microsoft.com/office/drawing/2014/main" id="{D7861877-B098-ED1E-1DEE-EF077BBA9F30}"/>
+              </a:ext>
+            </a:extLst>
+          </p:cNvPr>
           <p:cNvSpPr txBox="1"/>
           <p:nvPr/>
         </p:nvSpPr>
         <p:spPr>
           <a:xfrm>
-            <a:off x="344904" y="2277979"/>
-            <a:ext cx="3729791" cy="1892826"/>
+            <a:off x="9208713" y="5877155"/>
+            <a:ext cx="2266122" cy="369332"/>
           </a:xfrm>
           <a:prstGeom prst="rect">
             <a:avLst/>
@@ -3423,62 +3423,35 @@
           </a:bodyPr>
           <a:lstStyle/>
           <a:p>
-            <a:pPr>
-              <a:lnSpc>
-                <a:spcPct val="150000"/>
-              </a:lnSpc>
-            </a:pPr>
-            <a:r>
-              <a:rPr lang="hu-HU" sz="2600" dirty="0" smtClean="0">
+            <a:pPr algn="ctr"/>
+            <a:r>
+              <a:rPr lang="hu-HU" dirty="0">
                 <a:solidFill>
                   <a:srgbClr val="FE4755"/>
                 </a:solidFill>
+                <a:latin typeface="Arial Nova" panose="020B0504020202020204" pitchFamily="34" charset="0"/>
               </a:rPr>
-              <a:t>Jira kezelése</a:t>
-            </a:r>
-          </a:p>
-          <a:p>
-            <a:pPr>
-              <a:lnSpc>
-                <a:spcPct val="150000"/>
-              </a:lnSpc>
-            </a:pPr>
-            <a:r>
-              <a:rPr lang="hu-HU" sz="2600" dirty="0" smtClean="0">
-                <a:solidFill>
-                  <a:srgbClr val="FE4755"/>
-                </a:solidFill>
-              </a:rPr>
-              <a:t>Sprintek indítása/lezárása</a:t>
-            </a:r>
-          </a:p>
-          <a:p>
-            <a:pPr>
-              <a:lnSpc>
-                <a:spcPct val="150000"/>
-              </a:lnSpc>
-            </a:pPr>
-            <a:r>
-              <a:rPr lang="hu-HU" sz="2600" dirty="0" smtClean="0">
-                <a:solidFill>
-                  <a:srgbClr val="FE4755"/>
-                </a:solidFill>
-              </a:rPr>
-              <a:t>Feladatok beosztása</a:t>
-            </a:r>
-          </a:p>
-        </p:txBody>
-      </p:sp>
-      <p:sp>
-        <p:nvSpPr>
-          <p:cNvPr id="12" name="Szövegdoboz 11"/>
+              <a:t>Részlet az aloldalból</a:t>
+            </a:r>
+          </a:p>
+        </p:txBody>
+      </p:sp>
+      <p:sp>
+        <p:nvSpPr>
+          <p:cNvPr id="15" name="Szövegdoboz 14">
+            <a:extLst>
+              <a:ext uri="{FF2B5EF4-FFF2-40B4-BE49-F238E27FC236}">
+                <a16:creationId xmlns:a16="http://schemas.microsoft.com/office/drawing/2014/main" id="{DC903C29-0836-ADC2-EDF9-D21C7664D7AC}"/>
+              </a:ext>
+            </a:extLst>
+          </p:cNvPr>
           <p:cNvSpPr txBox="1"/>
           <p:nvPr/>
         </p:nvSpPr>
         <p:spPr>
           <a:xfrm>
-            <a:off x="8220335" y="5701768"/>
-            <a:ext cx="2411365" cy="369332"/>
+            <a:off x="344904" y="2282532"/>
+            <a:ext cx="6122398" cy="2292935"/>
           </a:xfrm>
           <a:prstGeom prst="rect">
             <a:avLst/>
@@ -3491,21 +3464,71 @@
           </a:bodyPr>
           <a:lstStyle/>
           <a:p>
-            <a:pPr algn="ctr"/>
-            <a:r>
-              <a:rPr lang="hu-HU" dirty="0" smtClean="0">
+            <a:pPr>
+              <a:lnSpc>
+                <a:spcPct val="150000"/>
+              </a:lnSpc>
+            </a:pPr>
+            <a:r>
+              <a:rPr lang="hu-HU" sz="2600" dirty="0">
                 <a:solidFill>
                   <a:srgbClr val="FE4755"/>
                 </a:solidFill>
+                <a:latin typeface="Arial Nova" panose="020B0504020202020204" pitchFamily="34" charset="0"/>
               </a:rPr>
-              <a:t>A Jira felülete </a:t>
-            </a:r>
+              <a:t>A játékban található pályák bemutatása</a:t>
+            </a:r>
+          </a:p>
+          <a:p>
+            <a:pPr>
+              <a:lnSpc>
+                <a:spcPct val="150000"/>
+              </a:lnSpc>
+            </a:pPr>
+            <a:r>
+              <a:rPr lang="hu-HU" sz="2600" dirty="0">
+                <a:solidFill>
+                  <a:srgbClr val="FE4755"/>
+                </a:solidFill>
+                <a:latin typeface="Arial Nova" panose="020B0504020202020204" pitchFamily="34" charset="0"/>
+              </a:rPr>
+              <a:t>Tippek az élvezhetőbb játékhoz</a:t>
+            </a:r>
+          </a:p>
+          <a:p>
+            <a:pPr>
+              <a:lnSpc>
+                <a:spcPct val="150000"/>
+              </a:lnSpc>
+            </a:pPr>
+            <a:r>
+              <a:rPr lang="hu-HU" sz="2600" dirty="0">
+                <a:solidFill>
+                  <a:srgbClr val="FE4755"/>
+                </a:solidFill>
+                <a:latin typeface="Arial Nova" panose="020B0504020202020204" pitchFamily="34" charset="0"/>
+              </a:rPr>
+              <a:t>Az aloldalakon rövid történet a pályákról</a:t>
+            </a:r>
+          </a:p>
+          <a:p>
+            <a:endParaRPr lang="hu-HU" sz="2600" dirty="0">
+              <a:solidFill>
+                <a:srgbClr val="FE4755"/>
+              </a:solidFill>
+            </a:endParaRPr>
           </a:p>
         </p:txBody>
       </p:sp>
       <p:pic>
         <p:nvPicPr>
-          <p:cNvPr id="2" name="Kép 1"/>
+          <p:cNvPr id="5" name="Kép 4">
+            <a:extLst>
+              <a:ext uri="{FF2B5EF4-FFF2-40B4-BE49-F238E27FC236}">
+                <a16:creationId xmlns:a16="http://schemas.microsoft.com/office/drawing/2014/main" id="{21DC31AA-2254-ADC7-A497-1BF1B9C2C805}"/>
+              </a:ext>
+            </a:extLst>
+          </p:cNvPr>
           <p:cNvPicPr>
             <a:picLocks noChangeAspect="1"/>
           </p:cNvPicPr>
@@ -3519,8 +3542,8 @@
         </p:blipFill>
         <p:spPr>
           <a:xfrm>
-            <a:off x="6946230" y="1892968"/>
-            <a:ext cx="4959576" cy="3808800"/>
+            <a:off x="8836452" y="1072341"/>
+            <a:ext cx="3010644" cy="4713316"/>
           </a:xfrm>
           <a:prstGeom prst="rect">
             <a:avLst/>
@@ -3530,20 +3553,13 @@
     </p:spTree>
     <p:extLst>
       <p:ext uri="{BB962C8B-B14F-4D97-AF65-F5344CB8AC3E}">
-        <p14:creationId xmlns:p14="http://schemas.microsoft.com/office/powerpoint/2010/main" val="2791304380"/>
+        <p14:creationId xmlns:p14="http://schemas.microsoft.com/office/powerpoint/2010/main" val="2006050113"/>
       </p:ext>
     </p:extLst>
   </p:cSld>
   <p:clrMapOvr>
     <a:masterClrMapping/>
   </p:clrMapOvr>
-  <p:timing>
-    <p:tnLst>
-      <p:par>
-        <p:cTn id="1" dur="indefinite" restart="never" nodeType="tmRoot"/>
-      </p:par>
-    </p:tnLst>
-  </p:timing>
 </p:sld>
 </file>
 
@@ -3582,8 +3598,8 @@
         </p:nvSpPr>
         <p:spPr>
           <a:xfrm>
-            <a:off x="344904" y="16042"/>
-            <a:ext cx="7716253" cy="1876926"/>
+            <a:off x="344904" y="0"/>
+            <a:ext cx="8524776" cy="1892826"/>
           </a:xfrm>
           <a:prstGeom prst="rect">
             <a:avLst/>
@@ -3615,15 +3631,16 @@
           <a:p>
             <a:pPr algn="l"/>
             <a:r>
-              <a:rPr lang="hu-HU" sz="4500" dirty="0" smtClean="0">
+              <a:rPr lang="hu-HU" sz="4500" dirty="0">
                 <a:solidFill>
                   <a:srgbClr val="FE4755"/>
                 </a:solidFill>
+                <a:latin typeface="Arial Nova" panose="020B0504020202020204" pitchFamily="34" charset="0"/>
               </a:rPr>
               <a:t>Csanádi Kevin része a munkából</a:t>
             </a:r>
             <a:br>
-              <a:rPr lang="hu-HU" sz="4500" dirty="0" smtClean="0">
+              <a:rPr lang="hu-HU" sz="4500" dirty="0">
                 <a:solidFill>
                   <a:srgbClr val="FE4755"/>
                 </a:solidFill>
@@ -3645,8 +3662,8 @@
         </p:nvSpPr>
         <p:spPr>
           <a:xfrm>
-            <a:off x="585534" y="2229853"/>
-            <a:ext cx="4676277" cy="1292662"/>
+            <a:off x="344904" y="2290445"/>
+            <a:ext cx="6346841" cy="1818062"/>
           </a:xfrm>
           <a:prstGeom prst="rect">
             <a:avLst/>
@@ -3665,12 +3682,13 @@
               </a:lnSpc>
             </a:pPr>
             <a:r>
-              <a:rPr lang="hu-HU" sz="2600" dirty="0" smtClean="0">
+              <a:rPr lang="hu-HU" sz="2600" dirty="0">
                 <a:solidFill>
                   <a:srgbClr val="FE4755"/>
                 </a:solidFill>
+                <a:latin typeface="Arial Nova" panose="020B0504020202020204" pitchFamily="34" charset="0"/>
               </a:rPr>
-              <a:t>Github pages kezelése</a:t>
+              <a:t>Főoldal megtervezése</a:t>
             </a:r>
           </a:p>
           <a:p>
@@ -3680,10 +3698,478 @@
               </a:lnSpc>
             </a:pPr>
             <a:r>
-              <a:rPr lang="hu-HU" sz="2600" dirty="0" smtClean="0">
+              <a:rPr lang="hu-HU" sz="2600" dirty="0">
                 <a:solidFill>
                   <a:srgbClr val="FE4755"/>
                 </a:solidFill>
+                <a:latin typeface="Arial Nova" panose="020B0504020202020204" pitchFamily="34" charset="0"/>
+              </a:rPr>
+              <a:t>Főoldal design ötlet megvalósítása</a:t>
+            </a:r>
+          </a:p>
+          <a:p>
+            <a:pPr>
+              <a:lnSpc>
+                <a:spcPct val="150000"/>
+              </a:lnSpc>
+            </a:pPr>
+            <a:r>
+              <a:rPr lang="hu-HU" sz="2600" dirty="0">
+                <a:solidFill>
+                  <a:srgbClr val="FE4755"/>
+                </a:solidFill>
+                <a:latin typeface="Arial Nova" panose="020B0504020202020204" pitchFamily="34" charset="0"/>
+              </a:rPr>
+              <a:t>Ascent, Bind, Breeze aloldalak elkészítése</a:t>
+            </a:r>
+          </a:p>
+        </p:txBody>
+      </p:sp>
+      <p:pic>
+        <p:nvPicPr>
+          <p:cNvPr id="11" name="Kép 10"/>
+          <p:cNvPicPr>
+            <a:picLocks noChangeAspect="1"/>
+          </p:cNvPicPr>
+          <p:nvPr/>
+        </p:nvPicPr>
+        <p:blipFill>
+          <a:blip r:embed="rId2"/>
+          <a:stretch>
+            <a:fillRect/>
+          </a:stretch>
+        </p:blipFill>
+        <p:spPr>
+          <a:xfrm>
+            <a:off x="6896030" y="2278271"/>
+            <a:ext cx="4951066" cy="3810000"/>
+          </a:xfrm>
+          <a:prstGeom prst="rect">
+            <a:avLst/>
+          </a:prstGeom>
+        </p:spPr>
+      </p:pic>
+      <p:sp>
+        <p:nvSpPr>
+          <p:cNvPr id="12" name="Szövegdoboz 11"/>
+          <p:cNvSpPr txBox="1"/>
+          <p:nvPr/>
+        </p:nvSpPr>
+        <p:spPr>
+          <a:xfrm>
+            <a:off x="8030448" y="6066687"/>
+            <a:ext cx="2682229" cy="369332"/>
+          </a:xfrm>
+          <a:prstGeom prst="rect">
+            <a:avLst/>
+          </a:prstGeom>
+          <a:noFill/>
+        </p:spPr>
+        <p:txBody>
+          <a:bodyPr wrap="square" rtlCol="0">
+            <a:spAutoFit/>
+          </a:bodyPr>
+          <a:lstStyle/>
+          <a:p>
+            <a:r>
+              <a:rPr lang="hu-HU" dirty="0">
+                <a:solidFill>
+                  <a:srgbClr val="FE4755"/>
+                </a:solidFill>
+                <a:latin typeface="Arial Nova" panose="020B0504020202020204" pitchFamily="34" charset="0"/>
+              </a:rPr>
+              <a:t>Kódrészlet a főoldalból</a:t>
+            </a:r>
+          </a:p>
+        </p:txBody>
+      </p:sp>
+    </p:spTree>
+    <p:extLst>
+      <p:ext uri="{BB962C8B-B14F-4D97-AF65-F5344CB8AC3E}">
+        <p14:creationId xmlns:p14="http://schemas.microsoft.com/office/powerpoint/2010/main" val="17244451"/>
+      </p:ext>
+    </p:extLst>
+  </p:cSld>
+  <p:clrMapOvr>
+    <a:masterClrMapping/>
+  </p:clrMapOvr>
+</p:sld>
+</file>
+
+<file path=ppt/slides/slide5.xml><?xml version="1.0" encoding="utf-8"?>
+<p:sld xmlns:a="http://schemas.openxmlformats.org/drawingml/2006/main" xmlns:r="http://schemas.openxmlformats.org/officeDocument/2006/relationships" xmlns:p="http://schemas.openxmlformats.org/presentationml/2006/main">
+  <p:cSld>
+    <p:bg>
+      <p:bgPr>
+        <a:solidFill>
+          <a:srgbClr val="111721"/>
+        </a:solidFill>
+        <a:effectLst/>
+      </p:bgPr>
+    </p:bg>
+    <p:spTree>
+      <p:nvGrpSpPr>
+        <p:cNvPr id="1" name=""/>
+        <p:cNvGrpSpPr/>
+        <p:nvPr/>
+      </p:nvGrpSpPr>
+      <p:grpSpPr>
+        <a:xfrm>
+          <a:off x="0" y="0"/>
+          <a:ext cx="0" cy="0"/>
+          <a:chOff x="0" y="0"/>
+          <a:chExt cx="0" cy="0"/>
+        </a:xfrm>
+      </p:grpSpPr>
+      <p:sp>
+        <p:nvSpPr>
+          <p:cNvPr id="4" name="Cím 1"/>
+          <p:cNvSpPr txBox="1">
+            <a:spLocks/>
+          </p:cNvSpPr>
+          <p:nvPr/>
+        </p:nvSpPr>
+        <p:spPr>
+          <a:xfrm>
+            <a:off x="344904" y="16042"/>
+            <a:ext cx="8516463" cy="1876926"/>
+          </a:xfrm>
+          <a:prstGeom prst="rect">
+            <a:avLst/>
+          </a:prstGeom>
+        </p:spPr>
+        <p:txBody>
+          <a:bodyPr vert="horz" lIns="91440" tIns="45720" rIns="91440" bIns="45720" rtlCol="0" anchor="b">
+            <a:noAutofit/>
+          </a:bodyPr>
+          <a:lstStyle>
+            <a:lvl1pPr algn="ctr" defTabSz="914400" rtl="0" eaLnBrk="1" latinLnBrk="0" hangingPunct="1">
+              <a:lnSpc>
+                <a:spcPct val="90000"/>
+              </a:lnSpc>
+              <a:spcBef>
+                <a:spcPct val="0"/>
+              </a:spcBef>
+              <a:buNone/>
+              <a:defRPr sz="6000" kern="1200">
+                <a:solidFill>
+                  <a:schemeClr val="tx1"/>
+                </a:solidFill>
+                <a:latin typeface="+mj-lt"/>
+                <a:ea typeface="+mj-ea"/>
+                <a:cs typeface="+mj-cs"/>
+              </a:defRPr>
+            </a:lvl1pPr>
+          </a:lstStyle>
+          <a:p>
+            <a:pPr algn="l"/>
+            <a:r>
+              <a:rPr lang="hu-HU" sz="4500" dirty="0">
+                <a:solidFill>
+                  <a:srgbClr val="FE4755"/>
+                </a:solidFill>
+                <a:latin typeface="Arial Nova" panose="020B0504020202020204" pitchFamily="34" charset="0"/>
+              </a:rPr>
+              <a:t>Csanádi Kevin része a munkából</a:t>
+            </a:r>
+            <a:br>
+              <a:rPr lang="hu-HU" sz="4500" dirty="0">
+                <a:solidFill>
+                  <a:srgbClr val="FE4755"/>
+                </a:solidFill>
+              </a:rPr>
+            </a:br>
+            <a:endParaRPr lang="hu-HU" sz="4500" dirty="0">
+              <a:solidFill>
+                <a:srgbClr val="FE4755"/>
+              </a:solidFill>
+            </a:endParaRPr>
+          </a:p>
+        </p:txBody>
+      </p:sp>
+      <p:sp>
+        <p:nvSpPr>
+          <p:cNvPr id="9" name="Szövegdoboz 8"/>
+          <p:cNvSpPr txBox="1"/>
+          <p:nvPr/>
+        </p:nvSpPr>
+        <p:spPr>
+          <a:xfrm>
+            <a:off x="344904" y="2482587"/>
+            <a:ext cx="4667671" cy="1818062"/>
+          </a:xfrm>
+          <a:prstGeom prst="rect">
+            <a:avLst/>
+          </a:prstGeom>
+          <a:noFill/>
+        </p:spPr>
+        <p:txBody>
+          <a:bodyPr wrap="square" rtlCol="0">
+            <a:spAutoFit/>
+          </a:bodyPr>
+          <a:lstStyle/>
+          <a:p>
+            <a:pPr>
+              <a:lnSpc>
+                <a:spcPct val="150000"/>
+              </a:lnSpc>
+            </a:pPr>
+            <a:r>
+              <a:rPr lang="hu-HU" sz="2600" dirty="0">
+                <a:solidFill>
+                  <a:srgbClr val="FE4755"/>
+                </a:solidFill>
+                <a:latin typeface="Arial Nova" panose="020B0504020202020204" pitchFamily="34" charset="0"/>
+              </a:rPr>
+              <a:t>Jira kezelése</a:t>
+            </a:r>
+          </a:p>
+          <a:p>
+            <a:pPr>
+              <a:lnSpc>
+                <a:spcPct val="150000"/>
+              </a:lnSpc>
+            </a:pPr>
+            <a:r>
+              <a:rPr lang="hu-HU" sz="2600" dirty="0">
+                <a:solidFill>
+                  <a:srgbClr val="FE4755"/>
+                </a:solidFill>
+                <a:latin typeface="Arial Nova" panose="020B0504020202020204" pitchFamily="34" charset="0"/>
+              </a:rPr>
+              <a:t>Sprintek indítása/lezárása</a:t>
+            </a:r>
+          </a:p>
+          <a:p>
+            <a:pPr>
+              <a:lnSpc>
+                <a:spcPct val="150000"/>
+              </a:lnSpc>
+            </a:pPr>
+            <a:r>
+              <a:rPr lang="hu-HU" sz="2600" dirty="0">
+                <a:solidFill>
+                  <a:srgbClr val="FE4755"/>
+                </a:solidFill>
+                <a:latin typeface="Arial Nova" panose="020B0504020202020204" pitchFamily="34" charset="0"/>
+              </a:rPr>
+              <a:t>Feladatok beosztása</a:t>
+            </a:r>
+          </a:p>
+        </p:txBody>
+      </p:sp>
+      <p:sp>
+        <p:nvSpPr>
+          <p:cNvPr id="12" name="Szövegdoboz 11"/>
+          <p:cNvSpPr txBox="1"/>
+          <p:nvPr/>
+        </p:nvSpPr>
+        <p:spPr>
+          <a:xfrm>
+            <a:off x="7737537" y="5701768"/>
+            <a:ext cx="3534521" cy="369332"/>
+          </a:xfrm>
+          <a:prstGeom prst="rect">
+            <a:avLst/>
+          </a:prstGeom>
+          <a:noFill/>
+        </p:spPr>
+        <p:txBody>
+          <a:bodyPr wrap="square" rtlCol="0">
+            <a:spAutoFit/>
+          </a:bodyPr>
+          <a:lstStyle/>
+          <a:p>
+            <a:pPr algn="ctr"/>
+            <a:r>
+              <a:rPr lang="hu-HU" dirty="0">
+                <a:solidFill>
+                  <a:srgbClr val="FE4755"/>
+                </a:solidFill>
+                <a:latin typeface="Arial Nova" panose="020B0504020202020204" pitchFamily="34" charset="0"/>
+              </a:rPr>
+              <a:t>A Jira, ahol a sprinteket kezeljük </a:t>
+            </a:r>
+          </a:p>
+        </p:txBody>
+      </p:sp>
+      <p:pic>
+        <p:nvPicPr>
+          <p:cNvPr id="2" name="Kép 1"/>
+          <p:cNvPicPr>
+            <a:picLocks noChangeAspect="1"/>
+          </p:cNvPicPr>
+          <p:nvPr/>
+        </p:nvPicPr>
+        <p:blipFill>
+          <a:blip r:embed="rId2"/>
+          <a:stretch>
+            <a:fillRect/>
+          </a:stretch>
+        </p:blipFill>
+        <p:spPr>
+          <a:xfrm>
+            <a:off x="6887520" y="1892968"/>
+            <a:ext cx="4959576" cy="3808800"/>
+          </a:xfrm>
+          <a:prstGeom prst="rect">
+            <a:avLst/>
+          </a:prstGeom>
+        </p:spPr>
+      </p:pic>
+    </p:spTree>
+    <p:extLst>
+      <p:ext uri="{BB962C8B-B14F-4D97-AF65-F5344CB8AC3E}">
+        <p14:creationId xmlns:p14="http://schemas.microsoft.com/office/powerpoint/2010/main" val="2791304380"/>
+      </p:ext>
+    </p:extLst>
+  </p:cSld>
+  <p:clrMapOvr>
+    <a:masterClrMapping/>
+  </p:clrMapOvr>
+</p:sld>
+</file>
+
+<file path=ppt/slides/slide6.xml><?xml version="1.0" encoding="utf-8"?>
+<p:sld xmlns:a="http://schemas.openxmlformats.org/drawingml/2006/main" xmlns:r="http://schemas.openxmlformats.org/officeDocument/2006/relationships" xmlns:p="http://schemas.openxmlformats.org/presentationml/2006/main">
+  <p:cSld>
+    <p:bg>
+      <p:bgPr>
+        <a:solidFill>
+          <a:srgbClr val="111721"/>
+        </a:solidFill>
+        <a:effectLst/>
+      </p:bgPr>
+    </p:bg>
+    <p:spTree>
+      <p:nvGrpSpPr>
+        <p:cNvPr id="1" name=""/>
+        <p:cNvGrpSpPr/>
+        <p:nvPr/>
+      </p:nvGrpSpPr>
+      <p:grpSpPr>
+        <a:xfrm>
+          <a:off x="0" y="0"/>
+          <a:ext cx="0" cy="0"/>
+          <a:chOff x="0" y="0"/>
+          <a:chExt cx="0" cy="0"/>
+        </a:xfrm>
+      </p:grpSpPr>
+      <p:sp>
+        <p:nvSpPr>
+          <p:cNvPr id="4" name="Cím 1"/>
+          <p:cNvSpPr txBox="1">
+            <a:spLocks/>
+          </p:cNvSpPr>
+          <p:nvPr/>
+        </p:nvSpPr>
+        <p:spPr>
+          <a:xfrm>
+            <a:off x="344904" y="16042"/>
+            <a:ext cx="8508151" cy="1876926"/>
+          </a:xfrm>
+          <a:prstGeom prst="rect">
+            <a:avLst/>
+          </a:prstGeom>
+        </p:spPr>
+        <p:txBody>
+          <a:bodyPr vert="horz" lIns="91440" tIns="45720" rIns="91440" bIns="45720" rtlCol="0" anchor="b">
+            <a:noAutofit/>
+          </a:bodyPr>
+          <a:lstStyle>
+            <a:lvl1pPr algn="ctr" defTabSz="914400" rtl="0" eaLnBrk="1" latinLnBrk="0" hangingPunct="1">
+              <a:lnSpc>
+                <a:spcPct val="90000"/>
+              </a:lnSpc>
+              <a:spcBef>
+                <a:spcPct val="0"/>
+              </a:spcBef>
+              <a:buNone/>
+              <a:defRPr sz="6000" kern="1200">
+                <a:solidFill>
+                  <a:schemeClr val="tx1"/>
+                </a:solidFill>
+                <a:latin typeface="+mj-lt"/>
+                <a:ea typeface="+mj-ea"/>
+                <a:cs typeface="+mj-cs"/>
+              </a:defRPr>
+            </a:lvl1pPr>
+          </a:lstStyle>
+          <a:p>
+            <a:pPr algn="l"/>
+            <a:r>
+              <a:rPr lang="hu-HU" sz="4500" dirty="0">
+                <a:solidFill>
+                  <a:srgbClr val="FE4755"/>
+                </a:solidFill>
+                <a:latin typeface="Arial Nova" panose="020B0504020202020204" pitchFamily="34" charset="0"/>
+              </a:rPr>
+              <a:t>Csanádi Kevin része a munkából</a:t>
+            </a:r>
+            <a:br>
+              <a:rPr lang="hu-HU" sz="4500" dirty="0">
+                <a:solidFill>
+                  <a:srgbClr val="FE4755"/>
+                </a:solidFill>
+              </a:rPr>
+            </a:br>
+            <a:endParaRPr lang="hu-HU" sz="4500" dirty="0">
+              <a:solidFill>
+                <a:srgbClr val="FE4755"/>
+              </a:solidFill>
+            </a:endParaRPr>
+          </a:p>
+        </p:txBody>
+      </p:sp>
+      <p:sp>
+        <p:nvSpPr>
+          <p:cNvPr id="9" name="Szövegdoboz 8"/>
+          <p:cNvSpPr txBox="1"/>
+          <p:nvPr/>
+        </p:nvSpPr>
+        <p:spPr>
+          <a:xfrm>
+            <a:off x="530923" y="2504706"/>
+            <a:ext cx="4676277" cy="1217898"/>
+          </a:xfrm>
+          <a:prstGeom prst="rect">
+            <a:avLst/>
+          </a:prstGeom>
+          <a:noFill/>
+        </p:spPr>
+        <p:txBody>
+          <a:bodyPr wrap="square" rtlCol="0">
+            <a:spAutoFit/>
+          </a:bodyPr>
+          <a:lstStyle/>
+          <a:p>
+            <a:pPr>
+              <a:lnSpc>
+                <a:spcPct val="150000"/>
+              </a:lnSpc>
+            </a:pPr>
+            <a:r>
+              <a:rPr lang="hu-HU" sz="2600" dirty="0">
+                <a:solidFill>
+                  <a:srgbClr val="FE4755"/>
+                </a:solidFill>
+                <a:latin typeface="Arial Nova" panose="020B0504020202020204" pitchFamily="34" charset="0"/>
+              </a:rPr>
+              <a:t>Github pages kezelése</a:t>
+            </a:r>
+          </a:p>
+          <a:p>
+            <a:pPr>
+              <a:lnSpc>
+                <a:spcPct val="150000"/>
+              </a:lnSpc>
+            </a:pPr>
+            <a:r>
+              <a:rPr lang="hu-HU" sz="2600" dirty="0">
+                <a:solidFill>
+                  <a:srgbClr val="FE4755"/>
+                </a:solidFill>
+                <a:latin typeface="Arial Nova" panose="020B0504020202020204" pitchFamily="34" charset="0"/>
               </a:rPr>
               <a:t>Mapparendszer megvalósítása</a:t>
             </a:r>
@@ -3714,12 +4200,31 @@
           <a:p>
             <a:pPr algn="ctr"/>
             <a:r>
-              <a:rPr lang="hu-HU" dirty="0" smtClean="0">
+              <a:rPr lang="hu-HU" dirty="0">
                 <a:solidFill>
                   <a:srgbClr val="FE4755"/>
                 </a:solidFill>
+                <a:latin typeface="Arial Nova" panose="020B0504020202020204" pitchFamily="34" charset="0"/>
               </a:rPr>
-              <a:t>A Github felülete </a:t>
+              <a:t>A GitHub </a:t>
+            </a:r>
+            <a:r>
+              <a:rPr lang="en-US" dirty="0">
+                <a:solidFill>
+                  <a:srgbClr val="FE4755"/>
+                </a:solidFill>
+                <a:latin typeface="Arial Nova" panose="020B0504020202020204" pitchFamily="34" charset="0"/>
+              </a:rPr>
+              <a:t>rep</a:t>
+            </a:r>
+            <a:r>
+              <a:rPr lang="hu-HU" dirty="0">
+                <a:solidFill>
+                  <a:srgbClr val="FE4755"/>
+                </a:solidFill>
+                <a:latin typeface="Arial Nova" panose="020B0504020202020204" pitchFamily="34" charset="0"/>
+              </a:rPr>
+              <a:t>ónk </a:t>
             </a:r>
           </a:p>
         </p:txBody>
@@ -3740,7 +4245,7 @@
         </p:blipFill>
         <p:spPr>
           <a:xfrm>
-            <a:off x="6984801" y="1892968"/>
+            <a:off x="6984799" y="1899789"/>
             <a:ext cx="4939477" cy="3808800"/>
           </a:xfrm>
           <a:prstGeom prst="rect">
@@ -3758,13 +4263,6 @@
   <p:clrMapOvr>
     <a:masterClrMapping/>
   </p:clrMapOvr>
-  <p:timing>
-    <p:tnLst>
-      <p:par>
-        <p:cTn id="1" dur="indefinite" restart="never" nodeType="tmRoot"/>
-      </p:par>
-    </p:tnLst>
-  </p:timing>
 </p:sld>
 </file>
 

</xml_diff>